<commit_message>
Added sign(B) in the eigenmode calulation.
</commit_message>
<xml_diff>
--- a/Manuals/Tutorial/Tutorial.pptx
+++ b/Manuals/Tutorial/Tutorial.pptx
@@ -11684,8 +11684,8 @@
           </p:sp>
         </mc:Fallback>
       </mc:AlternateContent>
-      <mc:AlternateContent xmlns:mc="http://schemas.openxmlformats.org/markup-compatibility/2006" xmlns:a14="http://schemas.microsoft.com/office/drawing/2010/main">
-        <mc:Choice Requires="a14">
+      <mc:AlternateContent xmlns:mc="http://schemas.openxmlformats.org/markup-compatibility/2006">
+        <mc:Choice xmlns:a14="http://schemas.microsoft.com/office/drawing/2010/main" Requires="a14">
           <p:sp>
             <p:nvSpPr>
               <p:cNvPr id="6" name="テキスト ボックス 5">
@@ -11700,8 +11700,8 @@
             </p:nvSpPr>
             <p:spPr>
               <a:xfrm>
-                <a:off x="6223865" y="4535388"/>
-                <a:ext cx="6730384" cy="1425686"/>
+                <a:off x="4849663" y="5533979"/>
+                <a:ext cx="8361087" cy="1425686"/>
               </a:xfrm>
               <a:prstGeom prst="rect">
                 <a:avLst/>
@@ -11857,6 +11857,49 @@
                         </a:rPr>
                         <m:t>𝑖</m:t>
                       </m:r>
+                      <m:r>
+                        <a:rPr kumimoji="1" lang="en-US" altLang="ja-JP" sz="3600" b="0" i="1" smtClean="0">
+                          <a:latin typeface="Cambria Math" panose="02040503050406030204" pitchFamily="18" charset="0"/>
+                          <a:ea typeface="Spica Neue P" panose="02000503000000000000" pitchFamily="2" charset="-128"/>
+                          <a:cs typeface="Arial" panose="020B0604020202020204" pitchFamily="34" charset="0"/>
+                        </a:rPr>
+                        <m:t> </m:t>
+                      </m:r>
+                      <m:r>
+                        <m:rPr>
+                          <m:sty m:val="p"/>
+                        </m:rPr>
+                        <a:rPr kumimoji="1" lang="en-US" altLang="ja-JP" sz="3600" b="0" i="0" smtClean="0">
+                          <a:latin typeface="Cambria Math" panose="02040503050406030204" pitchFamily="18" charset="0"/>
+                          <a:ea typeface="Spica Neue P" panose="02000503000000000000" pitchFamily="2" charset="-128"/>
+                          <a:cs typeface="Arial" panose="020B0604020202020204" pitchFamily="34" charset="0"/>
+                        </a:rPr>
+                        <m:t>sgn</m:t>
+                      </m:r>
+                      <m:r>
+                        <a:rPr kumimoji="1" lang="en-US" altLang="ja-JP" sz="3600" b="0" i="1" smtClean="0">
+                          <a:latin typeface="Cambria Math" panose="02040503050406030204" pitchFamily="18" charset="0"/>
+                          <a:ea typeface="Spica Neue P" panose="02000503000000000000" pitchFamily="2" charset="-128"/>
+                          <a:cs typeface="Arial" panose="020B0604020202020204" pitchFamily="34" charset="0"/>
+                        </a:rPr>
+                        <m:t>⁡(</m:t>
+                      </m:r>
+                      <m:r>
+                        <a:rPr kumimoji="1" lang="en-US" altLang="ja-JP" sz="3600" b="0" i="1" smtClean="0">
+                          <a:latin typeface="Cambria Math" panose="02040503050406030204" pitchFamily="18" charset="0"/>
+                          <a:ea typeface="Spica Neue P" panose="02000503000000000000" pitchFamily="2" charset="-128"/>
+                          <a:cs typeface="Arial" panose="020B0604020202020204" pitchFamily="34" charset="0"/>
+                        </a:rPr>
+                        <m:t>𝐵</m:t>
+                      </m:r>
+                      <m:r>
+                        <a:rPr kumimoji="1" lang="en-US" altLang="ja-JP" sz="3600" b="0" i="1" smtClean="0">
+                          <a:latin typeface="Cambria Math" panose="02040503050406030204" pitchFamily="18" charset="0"/>
+                          <a:ea typeface="Spica Neue P" panose="02000503000000000000" pitchFamily="2" charset="-128"/>
+                          <a:cs typeface="Arial" panose="020B0604020202020204" pitchFamily="34" charset="0"/>
+                        </a:rPr>
+                        <m:t>)</m:t>
+                      </m:r>
                       <m:f>
                         <m:fPr>
                           <m:ctrlPr>
@@ -11983,7 +12026,7 @@
             </p:txBody>
           </p:sp>
         </mc:Choice>
-        <mc:Fallback xmlns="">
+        <mc:Fallback>
           <p:sp>
             <p:nvSpPr>
               <p:cNvPr id="6" name="テキスト ボックス 5">
@@ -12000,8 +12043,8 @@
             </p:nvSpPr>
             <p:spPr>
               <a:xfrm>
-                <a:off x="6223865" y="4535388"/>
-                <a:ext cx="6730384" cy="1425686"/>
+                <a:off x="4849663" y="5533979"/>
+                <a:ext cx="8361087" cy="1425686"/>
               </a:xfrm>
               <a:prstGeom prst="rect">
                 <a:avLst/>
@@ -12045,7 +12088,7 @@
         </p:nvSpPr>
         <p:spPr>
           <a:xfrm>
-            <a:off x="4624690" y="5118597"/>
+            <a:off x="3250512" y="6214682"/>
             <a:ext cx="1374154" cy="332044"/>
           </a:xfrm>
           <a:prstGeom prst="rightArrow">

</xml_diff>